<commit_message>
MacSuccess - Commented GitLatch Commit @ 2022-12-28-14-52-27-238
</commit_message>
<xml_diff>
--- a/WebFile.pptx
+++ b/WebFile.pptx
@@ -124,50 +124,6 @@
 </p1510:revInfo>
 </file>
 
-<file path=ppt/changesInfos/changesInfo1.xml><?xml version="1.0" encoding="utf-8"?>
-<pc:chgInfo xmlns:a="http://schemas.openxmlformats.org/drawingml/2006/main" xmlns:r="http://schemas.openxmlformats.org/officeDocument/2006/relationships" xmlns:ac="http://schemas.microsoft.com/office/drawing/2013/main/command" xmlns:pc="http://schemas.microsoft.com/office/powerpoint/2013/main/command">
-  <pc:docChgLst>
-    <pc:chgData name="TEST_TEST_SPOProvHeartbeat_E3_15_2211262300_10567" userId="S::admin@a830edad9050849567e22112623.onmicrosoft.com::a9ee3c03-47fc-4e1e-8a5c-e6c67826edf5" providerId="AD" clId="Web-{5A130050-35DF-4B4B-9425-060D07BAAEBA}"/>
-    <pc:docChg chg="addSld modSld replTag">
-      <pc:chgData name="TEST_TEST_SPOProvHeartbeat_E3_15_2211262300_10567" userId="S::admin@a830edad9050849567e22112623.onmicrosoft.com::a9ee3c03-47fc-4e1e-8a5c-e6c67826edf5" providerId="AD" clId="Web-{5A130050-35DF-4B4B-9425-060D07BAAEBA}" dt="2022-12-28T08:50:54.010" v="33"/>
-      <pc:docMkLst>
-        <pc:docMk/>
-      </pc:docMkLst>
-      <pc:sldChg chg="modSp">
-        <pc:chgData name="TEST_TEST_SPOProvHeartbeat_E3_15_2211262300_10567" userId="S::admin@a830edad9050849567e22112623.onmicrosoft.com::a9ee3c03-47fc-4e1e-8a5c-e6c67826edf5" providerId="AD" clId="Web-{5A130050-35DF-4B4B-9425-060D07BAAEBA}" dt="2022-12-28T08:46:53.520" v="9" actId="20577"/>
-        <pc:sldMkLst>
-          <pc:docMk/>
-          <pc:sldMk cId="109857222" sldId="256"/>
-        </pc:sldMkLst>
-        <pc:spChg chg="mod">
-          <ac:chgData name="TEST_TEST_SPOProvHeartbeat_E3_15_2211262300_10567" userId="S::admin@a830edad9050849567e22112623.onmicrosoft.com::a9ee3c03-47fc-4e1e-8a5c-e6c67826edf5" providerId="AD" clId="Web-{5A130050-35DF-4B4B-9425-060D07BAAEBA}" dt="2022-12-28T08:46:53.520" v="9" actId="20577"/>
-          <ac:spMkLst>
-            <pc:docMk/>
-            <pc:sldMk cId="109857222" sldId="256"/>
-            <ac:spMk id="2" creationId="{00000000-0000-0000-0000-000000000000}"/>
-          </ac:spMkLst>
-        </pc:spChg>
-      </pc:sldChg>
-      <pc:sldChg chg="modSp new">
-        <pc:chgData name="TEST_TEST_SPOProvHeartbeat_E3_15_2211262300_10567" userId="S::admin@a830edad9050849567e22112623.onmicrosoft.com::a9ee3c03-47fc-4e1e-8a5c-e6c67826edf5" providerId="AD" clId="Web-{5A130050-35DF-4B4B-9425-060D07BAAEBA}" dt="2022-12-28T08:50:49.041" v="30" actId="20577"/>
-        <pc:sldMkLst>
-          <pc:docMk/>
-          <pc:sldMk cId="1127892936" sldId="257"/>
-        </pc:sldMkLst>
-        <pc:spChg chg="mod">
-          <ac:chgData name="TEST_TEST_SPOProvHeartbeat_E3_15_2211262300_10567" userId="S::admin@a830edad9050849567e22112623.onmicrosoft.com::a9ee3c03-47fc-4e1e-8a5c-e6c67826edf5" providerId="AD" clId="Web-{5A130050-35DF-4B4B-9425-060D07BAAEBA}" dt="2022-12-28T08:50:49.041" v="30" actId="20577"/>
-          <ac:spMkLst>
-            <pc:docMk/>
-            <pc:sldMk cId="1127892936" sldId="257"/>
-            <ac:spMk id="3" creationId="{F0FE5E5A-EC77-F056-7D8B-EF357594CED1}"/>
-          </ac:spMkLst>
-        </pc:spChg>
-      </pc:sldChg>
-    </pc:docChg>
-  </pc:docChgLst>
-</pc:chgInfo>
-</file>
-
 <file path=ppt/slideLayouts/slideLayout1.xml><?xml version="1.0" encoding="utf-8"?>
 <p:sldLayout xmlns:a="http://schemas.openxmlformats.org/drawingml/2006/main" xmlns:r="http://schemas.openxmlformats.org/officeDocument/2006/relationships" xmlns:p="http://schemas.openxmlformats.org/presentationml/2006/main" type="title" preserve="1">
   <p:cSld name="Title Slide">
@@ -299,7 +255,7 @@
           <a:p>
             <a:fld id="{846CE7D5-CF57-46EF-B807-FDD0502418D4}" type="datetimeFigureOut">
               <a:rPr lang="en-US" smtClean="0"/>
-              <a:t>12/28/2022</a:t>
+              <a:t>12/28/22</a:t>
             </a:fld>
             <a:endParaRPr lang="en-US"/>
           </a:p>
@@ -469,7 +425,7 @@
           <a:p>
             <a:fld id="{846CE7D5-CF57-46EF-B807-FDD0502418D4}" type="datetimeFigureOut">
               <a:rPr lang="en-US" smtClean="0"/>
-              <a:t>12/28/2022</a:t>
+              <a:t>12/28/22</a:t>
             </a:fld>
             <a:endParaRPr lang="en-US"/>
           </a:p>
@@ -649,7 +605,7 @@
           <a:p>
             <a:fld id="{846CE7D5-CF57-46EF-B807-FDD0502418D4}" type="datetimeFigureOut">
               <a:rPr lang="en-US" smtClean="0"/>
-              <a:t>12/28/2022</a:t>
+              <a:t>12/28/22</a:t>
             </a:fld>
             <a:endParaRPr lang="en-US"/>
           </a:p>
@@ -819,7 +775,7 @@
           <a:p>
             <a:fld id="{846CE7D5-CF57-46EF-B807-FDD0502418D4}" type="datetimeFigureOut">
               <a:rPr lang="en-US" smtClean="0"/>
-              <a:t>12/28/2022</a:t>
+              <a:t>12/28/22</a:t>
             </a:fld>
             <a:endParaRPr lang="en-US"/>
           </a:p>
@@ -1065,7 +1021,7 @@
           <a:p>
             <a:fld id="{846CE7D5-CF57-46EF-B807-FDD0502418D4}" type="datetimeFigureOut">
               <a:rPr lang="en-US" smtClean="0"/>
-              <a:t>12/28/2022</a:t>
+              <a:t>12/28/22</a:t>
             </a:fld>
             <a:endParaRPr lang="en-US"/>
           </a:p>
@@ -1297,7 +1253,7 @@
           <a:p>
             <a:fld id="{846CE7D5-CF57-46EF-B807-FDD0502418D4}" type="datetimeFigureOut">
               <a:rPr lang="en-US" smtClean="0"/>
-              <a:t>12/28/2022</a:t>
+              <a:t>12/28/22</a:t>
             </a:fld>
             <a:endParaRPr lang="en-US"/>
           </a:p>
@@ -1664,7 +1620,7 @@
           <a:p>
             <a:fld id="{846CE7D5-CF57-46EF-B807-FDD0502418D4}" type="datetimeFigureOut">
               <a:rPr lang="en-US" smtClean="0"/>
-              <a:t>12/28/2022</a:t>
+              <a:t>12/28/22</a:t>
             </a:fld>
             <a:endParaRPr lang="en-US"/>
           </a:p>
@@ -1782,7 +1738,7 @@
           <a:p>
             <a:fld id="{846CE7D5-CF57-46EF-B807-FDD0502418D4}" type="datetimeFigureOut">
               <a:rPr lang="en-US" smtClean="0"/>
-              <a:t>12/28/2022</a:t>
+              <a:t>12/28/22</a:t>
             </a:fld>
             <a:endParaRPr lang="en-US"/>
           </a:p>
@@ -1877,7 +1833,7 @@
           <a:p>
             <a:fld id="{846CE7D5-CF57-46EF-B807-FDD0502418D4}" type="datetimeFigureOut">
               <a:rPr lang="en-US" smtClean="0"/>
-              <a:t>12/28/2022</a:t>
+              <a:t>12/28/22</a:t>
             </a:fld>
             <a:endParaRPr lang="en-US"/>
           </a:p>
@@ -2154,7 +2110,7 @@
           <a:p>
             <a:fld id="{846CE7D5-CF57-46EF-B807-FDD0502418D4}" type="datetimeFigureOut">
               <a:rPr lang="en-US" smtClean="0"/>
-              <a:t>12/28/2022</a:t>
+              <a:t>12/28/22</a:t>
             </a:fld>
             <a:endParaRPr lang="en-US"/>
           </a:p>
@@ -2411,7 +2367,7 @@
           <a:p>
             <a:fld id="{846CE7D5-CF57-46EF-B807-FDD0502418D4}" type="datetimeFigureOut">
               <a:rPr lang="en-US" smtClean="0"/>
-              <a:t>12/28/2022</a:t>
+              <a:t>12/28/22</a:t>
             </a:fld>
             <a:endParaRPr lang="en-US"/>
           </a:p>
@@ -2624,7 +2580,7 @@
           <a:p>
             <a:fld id="{846CE7D5-CF57-46EF-B807-FDD0502418D4}" type="datetimeFigureOut">
               <a:rPr lang="en-US" smtClean="0"/>
-              <a:t>12/28/2022</a:t>
+              <a:t>12/28/22</a:t>
             </a:fld>
             <a:endParaRPr lang="en-US"/>
           </a:p>
@@ -3182,11 +3138,11 @@
 
 <file path=ppt/tags/tag1.xml><?xml version="1.0" encoding="utf-8"?>
 <p:tagLst xmlns:a="http://schemas.openxmlformats.org/drawingml/2006/main" xmlns:r="http://schemas.openxmlformats.org/officeDocument/2006/relationships" xmlns:p="http://schemas.openxmlformats.org/presentationml/2006/main">
+  <p:tag name="GITLATCHSETTINGSCP.OWNERNAME" val="Test1135"/>
+  <p:tag name="GITLATCHSETTINGSCP.REPONAME" val="testaddin"/>
   <p:tag name="GITLATCHSETTINGSCP.BRANCH" val="gitlatch"/>
   <p:tag name="GITLATCHSETTINGSCP.FILENAME" val="WebFile"/>
   <p:tag name="GITLATCHSETTINGSCP.AUTOSHOW" val="YES"/>
-  <p:tag name="GITLATCHSETTINGSCP.OWNERNAME" val="Test1135"/>
-  <p:tag name="GITLATCHSETTINGSCP.REPONAME" val="testaddin"/>
 </p:tagLst>
 </file>
 

</xml_diff>